<commit_message>
updated PPIT oral presentation draft
</commit_message>
<xml_diff>
--- a/PPIT/OralPresentation.pptx
+++ b/PPIT/OralPresentation.pptx
@@ -8,7 +8,10 @@
     <p:sldId id="256" r:id="rId2"/>
     <p:sldId id="257" r:id="rId3"/>
     <p:sldId id="258" r:id="rId4"/>
-    <p:sldId id="259" r:id="rId5"/>
+    <p:sldId id="261" r:id="rId5"/>
+    <p:sldId id="260" r:id="rId6"/>
+    <p:sldId id="259" r:id="rId7"/>
+    <p:sldId id="262" r:id="rId8"/>
   </p:sldIdLst>
   <p:sldSz cx="12192000" cy="6858000"/>
   <p:notesSz cx="6858000" cy="9144000"/>
@@ -6097,7 +6100,7 @@
             </a:r>
             <a:r>
               <a:rPr lang="en-US" dirty="0" smtClean="0"/>
-              <a:t> Early warning system</a:t>
+              <a:t> Early warning system in India</a:t>
             </a:r>
             <a:endParaRPr lang="en-US" dirty="0"/>
           </a:p>
@@ -6334,6 +6337,256 @@
           <a:lstStyle/>
           <a:p>
             <a:r>
+              <a:rPr lang="en-US" dirty="0"/>
+              <a:t>Before Earthquake </a:t>
+            </a:r>
+            <a:r>
+              <a:rPr lang="mr-IN" dirty="0"/>
+              <a:t>–</a:t>
+            </a:r>
+            <a:r>
+              <a:rPr lang="en-US" dirty="0"/>
+              <a:t> Early warning system in </a:t>
+            </a:r>
+            <a:r>
+              <a:rPr lang="en-US" dirty="0" smtClean="0"/>
+              <a:t>Japan</a:t>
+            </a:r>
+            <a:endParaRPr lang="en-US" dirty="0"/>
+          </a:p>
+        </p:txBody>
+      </p:sp>
+      <p:sp>
+        <p:nvSpPr>
+          <p:cNvPr id="3" name="Content Placeholder 2"/>
+          <p:cNvSpPr>
+            <a:spLocks noGrp="1"/>
+          </p:cNvSpPr>
+          <p:nvPr>
+            <p:ph idx="1"/>
+          </p:nvPr>
+        </p:nvSpPr>
+        <p:spPr/>
+        <p:txBody>
+          <a:bodyPr/>
+          <a:lstStyle/>
+          <a:p>
+            <a:r>
+              <a:rPr lang="en-US" dirty="0">
+                <a:hlinkClick r:id="rId2"/>
+              </a:rPr>
+              <a:t>https://www.technologyreview.com/s/423279/how-japans-earthquake-and-tsunami-warning-systems-work</a:t>
+            </a:r>
+            <a:r>
+              <a:rPr lang="en-US" dirty="0" smtClean="0">
+                <a:hlinkClick r:id="rId2"/>
+              </a:rPr>
+              <a:t>/</a:t>
+            </a:r>
+            <a:endParaRPr lang="en-US" dirty="0" smtClean="0"/>
+          </a:p>
+          <a:p>
+            <a:r>
+              <a:rPr lang="en-US" dirty="0">
+                <a:hlinkClick r:id="rId3"/>
+              </a:rPr>
+              <a:t>http://</a:t>
+            </a:r>
+            <a:r>
+              <a:rPr lang="en-US" dirty="0" smtClean="0">
+                <a:hlinkClick r:id="rId3"/>
+              </a:rPr>
+              <a:t>www.jma.go.jp/jma/en/Activities/eew1.html</a:t>
+            </a:r>
+            <a:endParaRPr lang="en-US" dirty="0" smtClean="0"/>
+          </a:p>
+          <a:p>
+            <a:endParaRPr lang="en-US" dirty="0"/>
+          </a:p>
+        </p:txBody>
+      </p:sp>
+    </p:spTree>
+    <p:extLst>
+      <p:ext uri="{BB962C8B-B14F-4D97-AF65-F5344CB8AC3E}">
+        <p14:creationId xmlns:p14="http://schemas.microsoft.com/office/powerpoint/2010/main" val="1451179887"/>
+      </p:ext>
+    </p:extLst>
+  </p:cSld>
+  <p:clrMapOvr>
+    <a:masterClrMapping/>
+  </p:clrMapOvr>
+</p:sld>
+</file>
+
+<file path=ppt/slides/slide5.xml><?xml version="1.0" encoding="utf-8"?>
+<p:sld xmlns:a="http://schemas.openxmlformats.org/drawingml/2006/main" xmlns:r="http://schemas.openxmlformats.org/officeDocument/2006/relationships" xmlns:p="http://schemas.openxmlformats.org/presentationml/2006/main">
+  <p:cSld>
+    <p:spTree>
+      <p:nvGrpSpPr>
+        <p:cNvPr id="1" name=""/>
+        <p:cNvGrpSpPr/>
+        <p:nvPr/>
+      </p:nvGrpSpPr>
+      <p:grpSpPr>
+        <a:xfrm>
+          <a:off x="0" y="0"/>
+          <a:ext cx="0" cy="0"/>
+          <a:chOff x="0" y="0"/>
+          <a:chExt cx="0" cy="0"/>
+        </a:xfrm>
+      </p:grpSpPr>
+      <p:sp>
+        <p:nvSpPr>
+          <p:cNvPr id="2" name="Title 1"/>
+          <p:cNvSpPr>
+            <a:spLocks noGrp="1"/>
+          </p:cNvSpPr>
+          <p:nvPr>
+            <p:ph type="title"/>
+          </p:nvPr>
+        </p:nvSpPr>
+        <p:spPr/>
+        <p:txBody>
+          <a:bodyPr/>
+          <a:lstStyle/>
+          <a:p>
+            <a:r>
+              <a:rPr lang="en-US" dirty="0" smtClean="0"/>
+              <a:t>Before Earthquake </a:t>
+            </a:r>
+            <a:r>
+              <a:rPr lang="mr-IN" dirty="0" smtClean="0"/>
+              <a:t>–</a:t>
+            </a:r>
+            <a:r>
+              <a:rPr lang="en-US" dirty="0" smtClean="0"/>
+              <a:t> Early Warning system Research</a:t>
+            </a:r>
+            <a:endParaRPr lang="en-US" dirty="0"/>
+          </a:p>
+        </p:txBody>
+      </p:sp>
+      <p:sp>
+        <p:nvSpPr>
+          <p:cNvPr id="3" name="Content Placeholder 2"/>
+          <p:cNvSpPr>
+            <a:spLocks noGrp="1"/>
+          </p:cNvSpPr>
+          <p:nvPr>
+            <p:ph idx="1"/>
+          </p:nvPr>
+        </p:nvSpPr>
+        <p:spPr>
+          <a:xfrm>
+            <a:off x="1103312" y="2052919"/>
+            <a:ext cx="8946541" cy="3148474"/>
+          </a:xfrm>
+        </p:spPr>
+        <p:txBody>
+          <a:bodyPr/>
+          <a:lstStyle/>
+          <a:p>
+            <a:r>
+              <a:rPr lang="en-US" dirty="0" smtClean="0"/>
+              <a:t>Crowdsourcing Mobile phones </a:t>
+            </a:r>
+            <a:r>
+              <a:rPr lang="mr-IN" dirty="0" smtClean="0"/>
+              <a:t>–</a:t>
+            </a:r>
+            <a:r>
+              <a:rPr lang="en-US" dirty="0" smtClean="0"/>
+              <a:t> making use of GPS</a:t>
+            </a:r>
+          </a:p>
+          <a:p>
+            <a:endParaRPr lang="en-US" dirty="0"/>
+          </a:p>
+        </p:txBody>
+      </p:sp>
+      <p:sp>
+        <p:nvSpPr>
+          <p:cNvPr id="4" name="TextBox 3"/>
+          <p:cNvSpPr txBox="1"/>
+          <p:nvPr/>
+        </p:nvSpPr>
+        <p:spPr>
+          <a:xfrm>
+            <a:off x="1103312" y="6092042"/>
+            <a:ext cx="8946541" cy="246221"/>
+          </a:xfrm>
+          <a:prstGeom prst="rect">
+            <a:avLst/>
+          </a:prstGeom>
+          <a:noFill/>
+        </p:spPr>
+        <p:txBody>
+          <a:bodyPr wrap="square" rtlCol="0">
+            <a:spAutoFit/>
+          </a:bodyPr>
+          <a:lstStyle/>
+          <a:p>
+            <a:r>
+              <a:rPr lang="en-US" sz="1000" dirty="0"/>
+              <a:t>Source: http://</a:t>
+            </a:r>
+            <a:r>
+              <a:rPr lang="en-US" sz="1000" dirty="0" err="1"/>
+              <a:t>www.sciencemag.org</a:t>
+            </a:r>
+            <a:r>
+              <a:rPr lang="en-US" sz="1000" dirty="0"/>
+              <a:t>/news/2015/04/smart-phones-could-be-used-detect-earthquakes</a:t>
+            </a:r>
+          </a:p>
+        </p:txBody>
+      </p:sp>
+    </p:spTree>
+    <p:extLst>
+      <p:ext uri="{BB962C8B-B14F-4D97-AF65-F5344CB8AC3E}">
+        <p14:creationId xmlns:p14="http://schemas.microsoft.com/office/powerpoint/2010/main" val="1158855317"/>
+      </p:ext>
+    </p:extLst>
+  </p:cSld>
+  <p:clrMapOvr>
+    <a:masterClrMapping/>
+  </p:clrMapOvr>
+</p:sld>
+</file>
+
+<file path=ppt/slides/slide6.xml><?xml version="1.0" encoding="utf-8"?>
+<p:sld xmlns:a="http://schemas.openxmlformats.org/drawingml/2006/main" xmlns:r="http://schemas.openxmlformats.org/officeDocument/2006/relationships" xmlns:p="http://schemas.openxmlformats.org/presentationml/2006/main">
+  <p:cSld>
+    <p:spTree>
+      <p:nvGrpSpPr>
+        <p:cNvPr id="1" name=""/>
+        <p:cNvGrpSpPr/>
+        <p:nvPr/>
+      </p:nvGrpSpPr>
+      <p:grpSpPr>
+        <a:xfrm>
+          <a:off x="0" y="0"/>
+          <a:ext cx="0" cy="0"/>
+          <a:chOff x="0" y="0"/>
+          <a:chExt cx="0" cy="0"/>
+        </a:xfrm>
+      </p:grpSpPr>
+      <p:sp>
+        <p:nvSpPr>
+          <p:cNvPr id="2" name="Title 1"/>
+          <p:cNvSpPr>
+            <a:spLocks noGrp="1"/>
+          </p:cNvSpPr>
+          <p:nvPr>
+            <p:ph type="title"/>
+          </p:nvPr>
+        </p:nvSpPr>
+        <p:spPr/>
+        <p:txBody>
+          <a:bodyPr/>
+          <a:lstStyle/>
+          <a:p>
+            <a:r>
               <a:rPr lang="en-US" dirty="0" smtClean="0"/>
               <a:t>During Earthquake</a:t>
             </a:r>
@@ -6351,12 +6604,94 @@
             <p:ph idx="1"/>
           </p:nvPr>
         </p:nvSpPr>
-        <p:spPr/>
-        <p:txBody>
-          <a:bodyPr/>
-          <a:lstStyle/>
-          <a:p>
-            <a:endParaRPr lang="en-US"/>
+        <p:spPr>
+          <a:xfrm>
+            <a:off x="1103312" y="2052918"/>
+            <a:ext cx="8946541" cy="2530957"/>
+          </a:xfrm>
+        </p:spPr>
+        <p:txBody>
+          <a:bodyPr/>
+          <a:lstStyle/>
+          <a:p>
+            <a:r>
+              <a:rPr lang="en-US" dirty="0" smtClean="0"/>
+              <a:t>Measuring size of earthquake</a:t>
+            </a:r>
+          </a:p>
+          <a:p>
+            <a:pPr lvl="1"/>
+            <a:r>
+              <a:rPr lang="en-US" dirty="0" smtClean="0"/>
+              <a:t>Magnitude</a:t>
+            </a:r>
+          </a:p>
+          <a:p>
+            <a:pPr lvl="1"/>
+            <a:r>
+              <a:rPr lang="en-US" dirty="0" smtClean="0"/>
+              <a:t>Energy</a:t>
+            </a:r>
+          </a:p>
+          <a:p>
+            <a:pPr lvl="1"/>
+            <a:r>
+              <a:rPr lang="en-US" dirty="0" smtClean="0"/>
+              <a:t>Intensity</a:t>
+            </a:r>
+          </a:p>
+          <a:p>
+            <a:pPr lvl="1"/>
+            <a:r>
+              <a:rPr lang="en-US" dirty="0" smtClean="0"/>
+              <a:t>Depth</a:t>
+            </a:r>
+          </a:p>
+          <a:p>
+            <a:pPr lvl="1"/>
+            <a:endParaRPr lang="en-US" dirty="0"/>
+          </a:p>
+        </p:txBody>
+      </p:sp>
+      <p:sp>
+        <p:nvSpPr>
+          <p:cNvPr id="4" name="TextBox 3"/>
+          <p:cNvSpPr txBox="1"/>
+          <p:nvPr/>
+        </p:nvSpPr>
+        <p:spPr>
+          <a:xfrm>
+            <a:off x="1187532" y="5902036"/>
+            <a:ext cx="9001497" cy="246221"/>
+          </a:xfrm>
+          <a:prstGeom prst="rect">
+            <a:avLst/>
+          </a:prstGeom>
+          <a:noFill/>
+        </p:spPr>
+        <p:txBody>
+          <a:bodyPr wrap="square" rtlCol="0">
+            <a:spAutoFit/>
+          </a:bodyPr>
+          <a:lstStyle/>
+          <a:p>
+            <a:r>
+              <a:rPr lang="en-US" sz="1000" dirty="0"/>
+              <a:t>Source: https://</a:t>
+            </a:r>
+            <a:r>
+              <a:rPr lang="en-US" sz="1000" dirty="0" err="1"/>
+              <a:t>earthquake.usgs.gov</a:t>
+            </a:r>
+            <a:r>
+              <a:rPr lang="en-US" sz="1000" dirty="0"/>
+              <a:t>/learn/topics/</a:t>
+            </a:r>
+            <a:r>
+              <a:rPr lang="en-US" sz="1000" dirty="0" err="1"/>
+              <a:t>measure.php</a:t>
+            </a:r>
+            <a:endParaRPr lang="en-US" sz="1000" dirty="0"/>
           </a:p>
         </p:txBody>
       </p:sp>
@@ -6364,6 +6699,196 @@
     <p:extLst>
       <p:ext uri="{BB962C8B-B14F-4D97-AF65-F5344CB8AC3E}">
         <p14:creationId xmlns:p14="http://schemas.microsoft.com/office/powerpoint/2010/main" val="720659560"/>
+      </p:ext>
+    </p:extLst>
+  </p:cSld>
+  <p:clrMapOvr>
+    <a:masterClrMapping/>
+  </p:clrMapOvr>
+</p:sld>
+</file>
+
+<file path=ppt/slides/slide7.xml><?xml version="1.0" encoding="utf-8"?>
+<p:sld xmlns:a="http://schemas.openxmlformats.org/drawingml/2006/main" xmlns:r="http://schemas.openxmlformats.org/officeDocument/2006/relationships" xmlns:p="http://schemas.openxmlformats.org/presentationml/2006/main">
+  <p:cSld>
+    <p:spTree>
+      <p:nvGrpSpPr>
+        <p:cNvPr id="1" name=""/>
+        <p:cNvGrpSpPr/>
+        <p:nvPr/>
+      </p:nvGrpSpPr>
+      <p:grpSpPr>
+        <a:xfrm>
+          <a:off x="0" y="0"/>
+          <a:ext cx="0" cy="0"/>
+          <a:chOff x="0" y="0"/>
+          <a:chExt cx="0" cy="0"/>
+        </a:xfrm>
+      </p:grpSpPr>
+      <p:sp>
+        <p:nvSpPr>
+          <p:cNvPr id="2" name="Title 1"/>
+          <p:cNvSpPr>
+            <a:spLocks noGrp="1"/>
+          </p:cNvSpPr>
+          <p:nvPr>
+            <p:ph type="title"/>
+          </p:nvPr>
+        </p:nvSpPr>
+        <p:spPr/>
+        <p:txBody>
+          <a:bodyPr/>
+          <a:lstStyle/>
+          <a:p>
+            <a:r>
+              <a:rPr lang="en-US" dirty="0" smtClean="0"/>
+              <a:t>After Earthquake</a:t>
+            </a:r>
+            <a:endParaRPr lang="en-US" dirty="0"/>
+          </a:p>
+        </p:txBody>
+      </p:sp>
+      <p:sp>
+        <p:nvSpPr>
+          <p:cNvPr id="3" name="Content Placeholder 2"/>
+          <p:cNvSpPr>
+            <a:spLocks noGrp="1"/>
+          </p:cNvSpPr>
+          <p:nvPr>
+            <p:ph idx="1"/>
+          </p:nvPr>
+        </p:nvSpPr>
+        <p:spPr>
+          <a:xfrm>
+            <a:off x="1103312" y="2052918"/>
+            <a:ext cx="8946541" cy="2566583"/>
+          </a:xfrm>
+        </p:spPr>
+        <p:txBody>
+          <a:bodyPr/>
+          <a:lstStyle/>
+          <a:p>
+            <a:r>
+              <a:rPr lang="en-US" dirty="0" smtClean="0"/>
+              <a:t>Detection and alert for earthquake related activities</a:t>
+            </a:r>
+          </a:p>
+          <a:p>
+            <a:r>
+              <a:rPr lang="en-US" dirty="0" smtClean="0"/>
+              <a:t>In Australia </a:t>
+            </a:r>
+            <a:r>
+              <a:rPr lang="mr-IN" dirty="0" smtClean="0"/>
+              <a:t>–</a:t>
+            </a:r>
+            <a:r>
+              <a:rPr lang="en-US" dirty="0" smtClean="0"/>
+              <a:t> Geoscience Australia</a:t>
+            </a:r>
+          </a:p>
+          <a:p>
+            <a:pPr lvl="1"/>
+            <a:r>
+              <a:rPr lang="en-US" dirty="0" smtClean="0"/>
+              <a:t>monitors seismic data worldwide</a:t>
+            </a:r>
+          </a:p>
+          <a:p>
+            <a:pPr lvl="1"/>
+            <a:r>
+              <a:rPr lang="en-US" dirty="0" smtClean="0"/>
+              <a:t>Analyzed automatically and reviewed within 10 minutes of origin time</a:t>
+            </a:r>
+          </a:p>
+          <a:p>
+            <a:pPr lvl="1"/>
+            <a:r>
+              <a:rPr lang="en-US" dirty="0" smtClean="0"/>
+              <a:t>Results in alerts like tsunami alerts</a:t>
+            </a:r>
+          </a:p>
+          <a:p>
+            <a:r>
+              <a:rPr lang="en-US" dirty="0" smtClean="0"/>
+              <a:t>Earthquake database</a:t>
+            </a:r>
+          </a:p>
+          <a:p>
+            <a:pPr lvl="1"/>
+            <a:endParaRPr lang="en-US" dirty="0" smtClean="0"/>
+          </a:p>
+          <a:p>
+            <a:pPr lvl="1"/>
+            <a:endParaRPr lang="en-US" dirty="0"/>
+          </a:p>
+        </p:txBody>
+      </p:sp>
+      <p:sp>
+        <p:nvSpPr>
+          <p:cNvPr id="4" name="TextBox 3"/>
+          <p:cNvSpPr txBox="1"/>
+          <p:nvPr/>
+        </p:nvSpPr>
+        <p:spPr>
+          <a:xfrm>
+            <a:off x="1199408" y="5510151"/>
+            <a:ext cx="9084623" cy="400110"/>
+          </a:xfrm>
+          <a:prstGeom prst="rect">
+            <a:avLst/>
+          </a:prstGeom>
+          <a:noFill/>
+        </p:spPr>
+        <p:txBody>
+          <a:bodyPr wrap="square" rtlCol="0">
+            <a:spAutoFit/>
+          </a:bodyPr>
+          <a:lstStyle/>
+          <a:p>
+            <a:r>
+              <a:rPr lang="en-US" sz="1000" dirty="0"/>
+              <a:t>Source: </a:t>
+            </a:r>
+            <a:r>
+              <a:rPr lang="en-US" sz="1000" dirty="0">
+                <a:hlinkClick r:id="rId2"/>
+              </a:rPr>
+              <a:t>http://</a:t>
+            </a:r>
+            <a:r>
+              <a:rPr lang="en-US" sz="1000" dirty="0" smtClean="0">
+                <a:hlinkClick r:id="rId2"/>
+              </a:rPr>
+              <a:t>www.ga.gov.au/scientific-topics/hazards/earthquake/capabilties/monitoring</a:t>
+            </a:r>
+            <a:endParaRPr lang="en-US" sz="1000" dirty="0" smtClean="0"/>
+          </a:p>
+          <a:p>
+            <a:r>
+              <a:rPr lang="en-US" sz="1000" dirty="0"/>
+              <a:t>Source: http://</a:t>
+            </a:r>
+            <a:r>
+              <a:rPr lang="en-US" sz="1000" dirty="0" err="1"/>
+              <a:t>www.ga.gov.au</a:t>
+            </a:r>
+            <a:r>
+              <a:rPr lang="en-US" sz="1000" dirty="0"/>
+              <a:t>/earthquakes/</a:t>
+            </a:r>
+            <a:r>
+              <a:rPr lang="en-US" sz="1000" dirty="0" err="1"/>
+              <a:t>searchQuake.do</a:t>
+            </a:r>
+            <a:endParaRPr lang="en-US" sz="1000" dirty="0"/>
+          </a:p>
+        </p:txBody>
+      </p:sp>
+    </p:spTree>
+    <p:extLst>
+      <p:ext uri="{BB962C8B-B14F-4D97-AF65-F5344CB8AC3E}">
+        <p14:creationId xmlns:p14="http://schemas.microsoft.com/office/powerpoint/2010/main" val="434794592"/>
       </p:ext>
     </p:extLst>
   </p:cSld>

</xml_diff>